<commit_message>
Final commit - Added Poster.ppx and Final Project Report
</commit_message>
<xml_diff>
--- a/CRML_FinalPoster.pptx
+++ b/CRML_FinalPoster.pptx
@@ -4247,7 +4247,7 @@
               <a:defRPr/>
             </a:pPr>
             <a:r>
-              <a:rPr lang="en-US" sz="4800" b="0" kern="0" dirty="0">
+              <a:rPr lang="en-US" sz="4800" kern="0" dirty="0">
                 <a:solidFill>
                   <a:schemeClr val="bg1"/>
                 </a:solidFill>
@@ -4256,7 +4256,7 @@
               </a:rPr>
               <a:t>Simulation Results</a:t>
             </a:r>
-            <a:endParaRPr lang="he-IL" sz="4800" b="0" kern="0" dirty="0">
+            <a:endParaRPr lang="he-IL" sz="4800" kern="0" dirty="0">
               <a:solidFill>
                 <a:srgbClr val="FFFFFF"/>
               </a:solidFill>
@@ -4545,12 +4545,12 @@
               <a:buChar char="•"/>
             </a:pPr>
             <a:r>
-              <a:rPr lang="en-IL" sz="4000" b="0" dirty="0">
+              <a:rPr lang="en-IL" sz="4000" b="0">
                 <a:solidFill>
                   <a:schemeClr val="tx1"/>
                 </a:solidFill>
               </a:rPr>
-              <a:t>After a </a:t>
+              <a:t>After Certain </a:t>
             </a:r>
             <a:r>
               <a:rPr lang="en-US" sz="4000" b="0" dirty="0">

</xml_diff>